<commit_message>
added a coding slide
</commit_message>
<xml_diff>
--- a/Slides/On-Campus/09_01_1and0AddUp.pptx
+++ b/Slides/On-Campus/09_01_1and0AddUp.pptx
@@ -5,10 +5,10 @@
     <p:sldMasterId id="2147483648" r:id="rId1"/>
   </p:sldMasterIdLst>
   <p:notesMasterIdLst>
-    <p:notesMasterId r:id="rId12"/>
+    <p:notesMasterId r:id="rId13"/>
   </p:notesMasterIdLst>
   <p:handoutMasterIdLst>
-    <p:handoutMasterId r:id="rId13"/>
+    <p:handoutMasterId r:id="rId14"/>
   </p:handoutMasterIdLst>
   <p:sldIdLst>
     <p:sldId id="256" r:id="rId2"/>
@@ -21,6 +21,7 @@
     <p:sldId id="260" r:id="rId9"/>
     <p:sldId id="261" r:id="rId10"/>
     <p:sldId id="262" r:id="rId11"/>
+    <p:sldId id="275" r:id="rId12"/>
   </p:sldIdLst>
   <p:sldSz cx="13817600" cy="7772400"/>
   <p:notesSz cx="6858000" cy="9144000"/>
@@ -7893,7 +7894,7 @@
         <p:spPr>
           <a:xfrm>
             <a:off x="628075" y="1766856"/>
-            <a:ext cx="7042725" cy="5446744"/>
+            <a:ext cx="7485411" cy="5446744"/>
           </a:xfrm>
         </p:spPr>
         <p:txBody>
@@ -8472,6 +8473,122 @@
     <p:extLst>
       <p:ext uri="{BB962C8B-B14F-4D97-AF65-F5344CB8AC3E}">
         <p14:creationId xmlns:p14="http://schemas.microsoft.com/office/powerpoint/2010/main" val="2471670885"/>
+      </p:ext>
+    </p:extLst>
+  </p:cSld>
+  <p:clrMapOvr>
+    <a:masterClrMapping/>
+  </p:clrMapOvr>
+  <p:transition>
+    <p:fade/>
+  </p:transition>
+</p:sld>
+</file>
+
+<file path=ppt/slides/slide11.xml><?xml version="1.0" encoding="utf-8"?>
+<p:sld xmlns:a="http://schemas.openxmlformats.org/drawingml/2006/main" xmlns:r="http://schemas.openxmlformats.org/officeDocument/2006/relationships" xmlns:p="http://schemas.openxmlformats.org/presentationml/2006/main">
+  <p:cSld>
+    <p:spTree>
+      <p:nvGrpSpPr>
+        <p:cNvPr id="1" name=""/>
+        <p:cNvGrpSpPr/>
+        <p:nvPr/>
+      </p:nvGrpSpPr>
+      <p:grpSpPr>
+        <a:xfrm>
+          <a:off x="0" y="0"/>
+          <a:ext cx="0" cy="0"/>
+          <a:chOff x="0" y="0"/>
+          <a:chExt cx="0" cy="0"/>
+        </a:xfrm>
+      </p:grpSpPr>
+      <p:sp>
+        <p:nvSpPr>
+          <p:cNvPr id="2" name="Title 1">
+            <a:extLst>
+              <a:ext uri="{FF2B5EF4-FFF2-40B4-BE49-F238E27FC236}">
+                <a16:creationId xmlns:a16="http://schemas.microsoft.com/office/drawing/2014/main" id="{26A89E78-11AC-4620-9823-6373F0AFF089}"/>
+              </a:ext>
+            </a:extLst>
+          </p:cNvPr>
+          <p:cNvSpPr>
+            <a:spLocks noGrp="1"/>
+          </p:cNvSpPr>
+          <p:nvPr>
+            <p:ph type="title"/>
+          </p:nvPr>
+        </p:nvSpPr>
+        <p:spPr/>
+        <p:txBody>
+          <a:bodyPr/>
+          <a:lstStyle/>
+          <a:p>
+            <a:r>
+              <a:rPr lang="en-US" dirty="0"/>
+              <a:t>Coding Practice</a:t>
+            </a:r>
+          </a:p>
+        </p:txBody>
+      </p:sp>
+      <p:sp>
+        <p:nvSpPr>
+          <p:cNvPr id="3" name="Text Placeholder 2">
+            <a:extLst>
+              <a:ext uri="{FF2B5EF4-FFF2-40B4-BE49-F238E27FC236}">
+                <a16:creationId xmlns:a16="http://schemas.microsoft.com/office/drawing/2014/main" id="{785DCA79-164C-45F5-B1D6-2A1462F07077}"/>
+              </a:ext>
+            </a:extLst>
+          </p:cNvPr>
+          <p:cNvSpPr>
+            <a:spLocks noGrp="1"/>
+          </p:cNvSpPr>
+          <p:nvPr>
+            <p:ph type="body" idx="1"/>
+          </p:nvPr>
+        </p:nvSpPr>
+        <p:spPr/>
+        <p:txBody>
+          <a:bodyPr/>
+          <a:lstStyle/>
+          <a:p>
+            <a:r>
+              <a:rPr lang="en-US" dirty="0"/>
+              <a:t>First – Create a list with four numbers. Have the numbers be anywhere between 0 to 255 (your choice, just add them by default)</a:t>
+            </a:r>
+          </a:p>
+          <a:p>
+            <a:r>
+              <a:rPr lang="en-US" dirty="0"/>
+              <a:t>Second – create a second list.</a:t>
+            </a:r>
+          </a:p>
+          <a:p>
+            <a:pPr lvl="1"/>
+            <a:r>
+              <a:rPr lang="en-US" dirty="0"/>
+              <a:t>Convert each number in the first list to binary (bin(</a:t>
+            </a:r>
+            <a:r>
+              <a:rPr lang="en-US" dirty="0" err="1"/>
+              <a:t>val</a:t>
+            </a:r>
+            <a:r>
+              <a:rPr lang="en-US" dirty="0"/>
+              <a:t>) ) – and add it to the second list.</a:t>
+            </a:r>
+          </a:p>
+          <a:p>
+            <a:r>
+              <a:rPr lang="en-US" dirty="0"/>
+              <a:t>Third - Print out the new list</a:t>
+            </a:r>
+          </a:p>
+        </p:txBody>
+      </p:sp>
+    </p:spTree>
+    <p:extLst>
+      <p:ext uri="{BB962C8B-B14F-4D97-AF65-F5344CB8AC3E}">
+        <p14:creationId xmlns:p14="http://schemas.microsoft.com/office/powerpoint/2010/main" val="230612482"/>
       </p:ext>
     </p:extLst>
   </p:cSld>
@@ -8616,11 +8733,7 @@
             <a:pPr lvl="1"/>
             <a:r>
               <a:rPr lang="en-US" dirty="0"/>
-              <a:t>Hope this reminds you to keep coming </a:t>
-            </a:r>
-            <a:r>
-              <a:rPr lang="en-US"/>
-              <a:t>to class and keeping up! </a:t>
+              <a:t>Hope this reminds you to keep coming to class and keeping up! </a:t>
             </a:r>
           </a:p>
           <a:p>
@@ -9660,7 +9773,7 @@
                 </a:solidFill>
                 <a:hlinkClick r:id="rId3"/>
               </a:rPr>
-              <a:t>http://www.cs.colostate.edu/~cs150b</a:t>
+              <a:t>http://www.cs.colostate.edu/~cs150</a:t>
             </a:r>
             <a:r>
               <a:rPr lang="en" u="sng" dirty="0">

</xml_diff>